<commit_message>
erd in presi added
</commit_message>
<xml_diff>
--- a/doc/Presentation.pptx
+++ b/doc/Presentation.pptx
@@ -118,7 +118,18 @@
   </p:defaultTextStyle>
   <p:extLst>
     <p:ext uri="{EFAFB233-063F-42B5-8137-9DF3F51BA10A}">
-      <p15:sldGuideLst xmlns:p15="http://schemas.microsoft.com/office/powerpoint/2012/main" xmlns=""/>
+      <p15:sldGuideLst xmlns:p15="http://schemas.microsoft.com/office/powerpoint/2012/main">
+        <p15:guide id="1" orient="horz" pos="2160">
+          <p15:clr>
+            <a:srgbClr val="A4A3A4"/>
+          </p15:clr>
+        </p15:guide>
+        <p15:guide id="2" pos="3840">
+          <p15:clr>
+            <a:srgbClr val="A4A3A4"/>
+          </p15:clr>
+        </p15:guide>
+      </p15:sldGuideLst>
     </p:ext>
   </p:extLst>
 </p:presentation>
@@ -8661,25 +8672,35 @@
           </a:p>
         </p:txBody>
       </p:sp>
-      <p:sp>
-        <p:nvSpPr>
-          <p:cNvPr id="3" name="Content Placeholder 2"/>
-          <p:cNvSpPr>
-            <a:spLocks noGrp="1"/>
-          </p:cNvSpPr>
+      <p:pic>
+        <p:nvPicPr>
+          <p:cNvPr id="4" name="Inhaltsplatzhalter 3"/>
+          <p:cNvPicPr>
+            <a:picLocks noGrp="1" noChangeAspect="1"/>
+          </p:cNvPicPr>
           <p:nvPr>
             <p:ph idx="1"/>
           </p:nvPr>
-        </p:nvSpPr>
-        <p:spPr/>
-        <p:txBody>
-          <a:bodyPr/>
-          <a:lstStyle/>
-          <a:p>
-            <a:endParaRPr lang="en-US"/>
-          </a:p>
-        </p:txBody>
-      </p:sp>
+        </p:nvPicPr>
+        <p:blipFill>
+          <a:blip r:embed="rId2" cstate="print">
+            <a:extLst>
+              <a:ext uri="{28A0092B-C50C-407E-A947-70E740481C1C}">
+                <a14:useLocalDpi xmlns:a14="http://schemas.microsoft.com/office/drawing/2010/main" val="0"/>
+              </a:ext>
+            </a:extLst>
+          </a:blip>
+          <a:stretch>
+            <a:fillRect/>
+          </a:stretch>
+        </p:blipFill>
+        <p:spPr>
+          <a:xfrm>
+            <a:off x="1097280" y="2077253"/>
+            <a:ext cx="6617165" cy="3617568"/>
+          </a:xfrm>
+        </p:spPr>
+      </p:pic>
     </p:spTree>
     <p:extLst>
       <p:ext uri="{BB962C8B-B14F-4D97-AF65-F5344CB8AC3E}">
@@ -9218,7 +9239,7 @@
   <a:extraClrSchemeLst/>
   <a:extLst>
     <a:ext uri="{05A4C25C-085E-4340-85A3-A5531E510DB2}">
-      <thm15:themeFamily xmlns:thm15="http://schemas.microsoft.com/office/thememl/2012/main" xmlns="" name="Retrospect" id="{5F128B03-DCCA-4EEB-AB3B-CF2899314A46}" vid="{3F1AAB62-24C6-49D2-8E01-B56FAC9A3DCD}"/>
+      <thm15:themeFamily xmlns:thm15="http://schemas.microsoft.com/office/thememl/2012/main" name="Retrospect" id="{5F128B03-DCCA-4EEB-AB3B-CF2899314A46}" vid="{3F1AAB62-24C6-49D2-8E01-B56FAC9A3DCD}"/>
     </a:ext>
   </a:extLst>
 </a:theme>

</xml_diff>

<commit_message>
added uml to presentation
</commit_message>
<xml_diff>
--- a/doc/Presentation.pptx
+++ b/doc/Presentation.pptx
@@ -118,7 +118,7 @@
   </p:defaultTextStyle>
   <p:extLst>
     <p:ext uri="{EFAFB233-063F-42B5-8137-9DF3F51BA10A}">
-      <p15:sldGuideLst xmlns:p15="http://schemas.microsoft.com/office/powerpoint/2012/main" xmlns=""/>
+      <p15:sldGuideLst xmlns="" xmlns:p15="http://schemas.microsoft.com/office/powerpoint/2012/main"/>
     </p:ext>
   </p:extLst>
 </p:presentation>
@@ -8419,10 +8419,51 @@
           <a:bodyPr/>
           <a:lstStyle/>
           <a:p>
-            <a:endParaRPr lang="en-US"/>
+            <a:endParaRPr lang="en-US" dirty="0"/>
           </a:p>
         </p:txBody>
       </p:sp>
+      <p:pic>
+        <p:nvPicPr>
+          <p:cNvPr id="1026" name="Picture 2" descr="C:\Workspace\kronos\doc\Kronos_UML_Collect_Data.png"/>
+          <p:cNvPicPr>
+            <a:picLocks noChangeAspect="1" noChangeArrowheads="1"/>
+          </p:cNvPicPr>
+          <p:nvPr/>
+        </p:nvPicPr>
+        <p:blipFill>
+          <a:blip r:embed="rId2">
+            <a:extLst>
+              <a:ext uri="{28A0092B-C50C-407E-A947-70E740481C1C}">
+                <a14:useLocalDpi xmlns:a14="http://schemas.microsoft.com/office/drawing/2010/main" val="0"/>
+              </a:ext>
+            </a:extLst>
+          </a:blip>
+          <a:srcRect/>
+          <a:stretch>
+            <a:fillRect/>
+          </a:stretch>
+        </p:blipFill>
+        <p:spPr bwMode="auto">
+          <a:xfrm>
+            <a:off x="3322863" y="1775375"/>
+            <a:ext cx="4514501" cy="4531201"/>
+          </a:xfrm>
+          <a:prstGeom prst="rect">
+            <a:avLst/>
+          </a:prstGeom>
+          <a:noFill/>
+          <a:extLst>
+            <a:ext uri="{909E8E84-426E-40DD-AFC4-6F175D3DCCD1}">
+              <a14:hiddenFill xmlns:a14="http://schemas.microsoft.com/office/drawing/2010/main">
+                <a:solidFill>
+                  <a:srgbClr val="FFFFFF"/>
+                </a:solidFill>
+              </a14:hiddenFill>
+            </a:ext>
+          </a:extLst>
+        </p:spPr>
+      </p:pic>
     </p:spTree>
     <p:extLst>
       <p:ext uri="{BB962C8B-B14F-4D97-AF65-F5344CB8AC3E}">
@@ -8506,6 +8547,47 @@
           </a:p>
         </p:txBody>
       </p:sp>
+      <p:pic>
+        <p:nvPicPr>
+          <p:cNvPr id="2050" name="Picture 2" descr="C:\Workspace\kronos\doc\Kronos_UML_Create_Objects.png"/>
+          <p:cNvPicPr>
+            <a:picLocks noChangeAspect="1" noChangeArrowheads="1"/>
+          </p:cNvPicPr>
+          <p:nvPr/>
+        </p:nvPicPr>
+        <p:blipFill>
+          <a:blip r:embed="rId2">
+            <a:extLst>
+              <a:ext uri="{28A0092B-C50C-407E-A947-70E740481C1C}">
+                <a14:useLocalDpi xmlns:a14="http://schemas.microsoft.com/office/drawing/2010/main" val="0"/>
+              </a:ext>
+            </a:extLst>
+          </a:blip>
+          <a:srcRect/>
+          <a:stretch>
+            <a:fillRect/>
+          </a:stretch>
+        </p:blipFill>
+        <p:spPr bwMode="auto">
+          <a:xfrm>
+            <a:off x="1072044" y="1905531"/>
+            <a:ext cx="10088534" cy="4322616"/>
+          </a:xfrm>
+          <a:prstGeom prst="rect">
+            <a:avLst/>
+          </a:prstGeom>
+          <a:noFill/>
+          <a:extLst>
+            <a:ext uri="{909E8E84-426E-40DD-AFC4-6F175D3DCCD1}">
+              <a14:hiddenFill xmlns:a14="http://schemas.microsoft.com/office/drawing/2010/main">
+                <a:solidFill>
+                  <a:srgbClr val="FFFFFF"/>
+                </a:solidFill>
+              </a14:hiddenFill>
+            </a:ext>
+          </a:extLst>
+        </p:spPr>
+      </p:pic>
     </p:spTree>
     <p:extLst>
       <p:ext uri="{BB962C8B-B14F-4D97-AF65-F5344CB8AC3E}">
@@ -8568,7 +8650,7 @@
             </a:r>
             <a:r>
               <a:rPr lang="de-DE" dirty="0" err="1" smtClean="0"/>
-              <a:t>Observe</a:t>
+              <a:t>Product</a:t>
             </a:r>
             <a:r>
               <a:rPr lang="de-DE" dirty="0" smtClean="0"/>
@@ -8597,6 +8679,47 @@
           </a:p>
         </p:txBody>
       </p:sp>
+      <p:pic>
+        <p:nvPicPr>
+          <p:cNvPr id="3074" name="Picture 2" descr="C:\Workspace\kronos\doc\Kronos_UMl_ProductState.png"/>
+          <p:cNvPicPr>
+            <a:picLocks noChangeAspect="1" noChangeArrowheads="1"/>
+          </p:cNvPicPr>
+          <p:nvPr/>
+        </p:nvPicPr>
+        <p:blipFill>
+          <a:blip r:embed="rId2">
+            <a:extLst>
+              <a:ext uri="{28A0092B-C50C-407E-A947-70E740481C1C}">
+                <a14:useLocalDpi xmlns:a14="http://schemas.microsoft.com/office/drawing/2010/main" val="0"/>
+              </a:ext>
+            </a:extLst>
+          </a:blip>
+          <a:srcRect/>
+          <a:stretch>
+            <a:fillRect/>
+          </a:stretch>
+        </p:blipFill>
+        <p:spPr bwMode="auto">
+          <a:xfrm>
+            <a:off x="865156" y="1876367"/>
+            <a:ext cx="10123973" cy="4326936"/>
+          </a:xfrm>
+          <a:prstGeom prst="rect">
+            <a:avLst/>
+          </a:prstGeom>
+          <a:noFill/>
+          <a:extLst>
+            <a:ext uri="{909E8E84-426E-40DD-AFC4-6F175D3DCCD1}">
+              <a14:hiddenFill xmlns:a14="http://schemas.microsoft.com/office/drawing/2010/main">
+                <a:solidFill>
+                  <a:srgbClr val="FFFFFF"/>
+                </a:solidFill>
+              </a14:hiddenFill>
+            </a:ext>
+          </a:extLst>
+        </p:spPr>
+      </p:pic>
     </p:spTree>
     <p:extLst>
       <p:ext uri="{BB962C8B-B14F-4D97-AF65-F5344CB8AC3E}">
@@ -9218,7 +9341,7 @@
   <a:extraClrSchemeLst/>
   <a:extLst>
     <a:ext uri="{05A4C25C-085E-4340-85A3-A5531E510DB2}">
-      <thm15:themeFamily xmlns:thm15="http://schemas.microsoft.com/office/thememl/2012/main" xmlns="" name="Retrospect" id="{5F128B03-DCCA-4EEB-AB3B-CF2899314A46}" vid="{3F1AAB62-24C6-49D2-8E01-B56FAC9A3DCD}"/>
+      <thm15:themeFamily xmlns="" xmlns:thm15="http://schemas.microsoft.com/office/thememl/2012/main" name="Retrospect" id="{5F128B03-DCCA-4EEB-AB3B-CF2899314A46}" vid="{3F1AAB62-24C6-49D2-8E01-B56FAC9A3DCD}"/>
     </a:ext>
   </a:extLst>
 </a:theme>

</xml_diff>

<commit_message>
add ERD with views
</commit_message>
<xml_diff>
--- a/doc/Presentation.pptx
+++ b/doc/Presentation.pptx
@@ -118,7 +118,18 @@
   </p:defaultTextStyle>
   <p:extLst>
     <p:ext uri="{EFAFB233-063F-42B5-8137-9DF3F51BA10A}">
-      <p15:sldGuideLst xmlns:p15="http://schemas.microsoft.com/office/powerpoint/2012/main" xmlns=""/>
+      <p15:sldGuideLst xmlns:p15="http://schemas.microsoft.com/office/powerpoint/2012/main">
+        <p15:guide id="1" orient="horz" pos="2160">
+          <p15:clr>
+            <a:srgbClr val="A4A3A4"/>
+          </p15:clr>
+        </p15:guide>
+        <p15:guide id="2" pos="3840">
+          <p15:clr>
+            <a:srgbClr val="A4A3A4"/>
+          </p15:clr>
+        </p15:guide>
+      </p15:sldGuideLst>
     </p:ext>
   </p:extLst>
 </p:presentation>
@@ -350,7 +361,7 @@
           <a:p>
             <a:fld id="{02765E78-5A1D-4965-8594-771C8A34F00D}" type="datetimeFigureOut">
               <a:rPr lang="en-US" smtClean="0"/>
-              <a:t>7/22/2015</a:t>
+              <a:t>7/23/2015</a:t>
             </a:fld>
             <a:endParaRPr lang="en-US"/>
           </a:p>
@@ -558,7 +569,7 @@
           <a:p>
             <a:fld id="{02765E78-5A1D-4965-8594-771C8A34F00D}" type="datetimeFigureOut">
               <a:rPr lang="en-US" smtClean="0"/>
-              <a:t>7/22/2015</a:t>
+              <a:t>7/23/2015</a:t>
             </a:fld>
             <a:endParaRPr lang="en-US"/>
           </a:p>
@@ -814,7 +825,7 @@
           <a:p>
             <a:fld id="{02765E78-5A1D-4965-8594-771C8A34F00D}" type="datetimeFigureOut">
               <a:rPr lang="en-US" smtClean="0"/>
-              <a:t>7/22/2015</a:t>
+              <a:t>7/23/2015</a:t>
             </a:fld>
             <a:endParaRPr lang="en-US"/>
           </a:p>
@@ -988,7 +999,7 @@
           <a:p>
             <a:fld id="{02765E78-5A1D-4965-8594-771C8A34F00D}" type="datetimeFigureOut">
               <a:rPr lang="en-US" smtClean="0"/>
-              <a:t>7/22/2015</a:t>
+              <a:t>7/23/2015</a:t>
             </a:fld>
             <a:endParaRPr lang="en-US"/>
           </a:p>
@@ -1331,7 +1342,7 @@
           <a:p>
             <a:fld id="{02765E78-5A1D-4965-8594-771C8A34F00D}" type="datetimeFigureOut">
               <a:rPr lang="en-US" smtClean="0"/>
-              <a:t>7/22/2015</a:t>
+              <a:t>7/23/2015</a:t>
             </a:fld>
             <a:endParaRPr lang="en-US"/>
           </a:p>
@@ -1606,7 +1617,7 @@
           <a:p>
             <a:fld id="{02765E78-5A1D-4965-8594-771C8A34F00D}" type="datetimeFigureOut">
               <a:rPr lang="en-US" smtClean="0"/>
-              <a:t>7/22/2015</a:t>
+              <a:t>7/23/2015</a:t>
             </a:fld>
             <a:endParaRPr lang="en-US"/>
           </a:p>
@@ -1985,7 +1996,7 @@
           <a:p>
             <a:fld id="{02765E78-5A1D-4965-8594-771C8A34F00D}" type="datetimeFigureOut">
               <a:rPr lang="en-US" smtClean="0"/>
-              <a:t>7/22/2015</a:t>
+              <a:t>7/23/2015</a:t>
             </a:fld>
             <a:endParaRPr lang="en-US"/>
           </a:p>
@@ -2103,7 +2114,7 @@
           <a:p>
             <a:fld id="{02765E78-5A1D-4965-8594-771C8A34F00D}" type="datetimeFigureOut">
               <a:rPr lang="en-US" smtClean="0"/>
-              <a:t>7/22/2015</a:t>
+              <a:t>7/23/2015</a:t>
             </a:fld>
             <a:endParaRPr lang="en-US"/>
           </a:p>
@@ -2274,7 +2285,7 @@
           <a:p>
             <a:fld id="{02765E78-5A1D-4965-8594-771C8A34F00D}" type="datetimeFigureOut">
               <a:rPr lang="en-US" smtClean="0"/>
-              <a:t>7/22/2015</a:t>
+              <a:t>7/23/2015</a:t>
             </a:fld>
             <a:endParaRPr lang="en-US"/>
           </a:p>
@@ -2628,7 +2639,7 @@
           <a:p>
             <a:fld id="{02765E78-5A1D-4965-8594-771C8A34F00D}" type="datetimeFigureOut">
               <a:rPr lang="en-US" smtClean="0"/>
-              <a:t>7/22/2015</a:t>
+              <a:t>7/23/2015</a:t>
             </a:fld>
             <a:endParaRPr lang="en-US"/>
           </a:p>
@@ -3007,7 +3018,7 @@
           <a:p>
             <a:fld id="{02765E78-5A1D-4965-8594-771C8A34F00D}" type="datetimeFigureOut">
               <a:rPr lang="en-US" smtClean="0"/>
-              <a:t>7/22/2015</a:t>
+              <a:t>7/23/2015</a:t>
             </a:fld>
             <a:endParaRPr lang="en-US"/>
           </a:p>
@@ -3294,7 +3305,7 @@
           <a:p>
             <a:fld id="{02765E78-5A1D-4965-8594-771C8A34F00D}" type="datetimeFigureOut">
               <a:rPr lang="en-US" smtClean="0"/>
-              <a:t>7/22/2015</a:t>
+              <a:t>7/23/2015</a:t>
             </a:fld>
             <a:endParaRPr lang="en-US"/>
           </a:p>
@@ -7957,6 +7968,13 @@
   <p:clrMapOvr>
     <a:masterClrMapping/>
   </p:clrMapOvr>
+  <p:timing>
+    <p:tnLst>
+      <p:par>
+        <p:cTn id="1" dur="indefinite" restart="never" nodeType="tmRoot"/>
+      </p:par>
+    </p:tnLst>
+  </p:timing>
 </p:sld>
 </file>
 
@@ -8025,6 +8043,13 @@
   <p:clrMapOvr>
     <a:masterClrMapping/>
   </p:clrMapOvr>
+  <p:timing>
+    <p:tnLst>
+      <p:par>
+        <p:cTn id="1" dur="indefinite" restart="never" nodeType="tmRoot"/>
+      </p:par>
+    </p:tnLst>
+  </p:timing>
 </p:sld>
 </file>
 
@@ -8784,25 +8809,6 @@
           </a:p>
         </p:txBody>
       </p:sp>
-      <p:sp>
-        <p:nvSpPr>
-          <p:cNvPr id="3" name="Content Placeholder 2"/>
-          <p:cNvSpPr>
-            <a:spLocks noGrp="1"/>
-          </p:cNvSpPr>
-          <p:nvPr>
-            <p:ph idx="1"/>
-          </p:nvPr>
-        </p:nvSpPr>
-        <p:spPr/>
-        <p:txBody>
-          <a:bodyPr/>
-          <a:lstStyle/>
-          <a:p>
-            <a:endParaRPr lang="en-US"/>
-          </a:p>
-        </p:txBody>
-      </p:sp>
       <p:pic>
         <p:nvPicPr>
           <p:cNvPr id="1026" name="Picture 2" descr="C:\Workspace\kronos\doc\Ind4ERD.png"/>
@@ -8844,6 +8850,36 @@
           </a:extLst>
         </p:spPr>
       </p:pic>
+      <p:pic>
+        <p:nvPicPr>
+          <p:cNvPr id="8" name="Grafik 7"/>
+          <p:cNvPicPr>
+            <a:picLocks noChangeAspect="1"/>
+          </p:cNvPicPr>
+          <p:nvPr/>
+        </p:nvPicPr>
+        <p:blipFill>
+          <a:blip r:embed="rId3" cstate="print">
+            <a:extLst>
+              <a:ext uri="{28A0092B-C50C-407E-A947-70E740481C1C}">
+                <a14:useLocalDpi xmlns:a14="http://schemas.microsoft.com/office/drawing/2010/main" val="0"/>
+              </a:ext>
+            </a:extLst>
+          </a:blip>
+          <a:stretch>
+            <a:fillRect/>
+          </a:stretch>
+        </p:blipFill>
+        <p:spPr>
+          <a:xfrm>
+            <a:off x="1086756" y="1761898"/>
+            <a:ext cx="9911802" cy="4560605"/>
+          </a:xfrm>
+          <a:prstGeom prst="rect">
+            <a:avLst/>
+          </a:prstGeom>
+        </p:spPr>
+      </p:pic>
     </p:spTree>
     <p:extLst>
       <p:ext uri="{BB962C8B-B14F-4D97-AF65-F5344CB8AC3E}">
@@ -8857,7 +8893,83 @@
   <p:timing>
     <p:tnLst>
       <p:par>
-        <p:cTn id="1" dur="indefinite" restart="never" nodeType="tmRoot"/>
+        <p:cTn id="1" dur="indefinite" restart="never" nodeType="tmRoot">
+          <p:childTnLst>
+            <p:seq concurrent="1" nextAc="seek">
+              <p:cTn id="2" dur="indefinite" nodeType="mainSeq">
+                <p:childTnLst>
+                  <p:par>
+                    <p:cTn id="3" fill="hold">
+                      <p:stCondLst>
+                        <p:cond delay="indefinite"/>
+                      </p:stCondLst>
+                      <p:childTnLst>
+                        <p:par>
+                          <p:cTn id="4" fill="hold">
+                            <p:stCondLst>
+                              <p:cond delay="0"/>
+                            </p:stCondLst>
+                            <p:childTnLst>
+                              <p:par>
+                                <p:cTn id="5" presetID="10" presetClass="entr" presetSubtype="0" fill="hold" nodeType="clickEffect">
+                                  <p:stCondLst>
+                                    <p:cond delay="0"/>
+                                  </p:stCondLst>
+                                  <p:childTnLst>
+                                    <p:set>
+                                      <p:cBhvr>
+                                        <p:cTn id="6" dur="1" fill="hold">
+                                          <p:stCondLst>
+                                            <p:cond delay="0"/>
+                                          </p:stCondLst>
+                                        </p:cTn>
+                                        <p:tgtEl>
+                                          <p:spTgt spid="8"/>
+                                        </p:tgtEl>
+                                        <p:attrNameLst>
+                                          <p:attrName>style.visibility</p:attrName>
+                                        </p:attrNameLst>
+                                      </p:cBhvr>
+                                      <p:to>
+                                        <p:strVal val="visible"/>
+                                      </p:to>
+                                    </p:set>
+                                    <p:animEffect transition="in" filter="fade">
+                                      <p:cBhvr>
+                                        <p:cTn id="7" dur="500"/>
+                                        <p:tgtEl>
+                                          <p:spTgt spid="8"/>
+                                        </p:tgtEl>
+                                      </p:cBhvr>
+                                    </p:animEffect>
+                                  </p:childTnLst>
+                                </p:cTn>
+                              </p:par>
+                            </p:childTnLst>
+                          </p:cTn>
+                        </p:par>
+                      </p:childTnLst>
+                    </p:cTn>
+                  </p:par>
+                </p:childTnLst>
+              </p:cTn>
+              <p:prevCondLst>
+                <p:cond evt="onPrev" delay="0">
+                  <p:tgtEl>
+                    <p:sldTgt/>
+                  </p:tgtEl>
+                </p:cond>
+              </p:prevCondLst>
+              <p:nextCondLst>
+                <p:cond evt="onNext" delay="0">
+                  <p:tgtEl>
+                    <p:sldTgt/>
+                  </p:tgtEl>
+                </p:cond>
+              </p:nextCondLst>
+            </p:seq>
+          </p:childTnLst>
+        </p:cTn>
       </p:par>
     </p:tnLst>
   </p:timing>
@@ -9001,7 +9113,12 @@
             <p:ph idx="1"/>
           </p:nvPr>
         </p:nvSpPr>
-        <p:spPr/>
+        <p:spPr>
+          <a:xfrm>
+            <a:off x="1097280" y="2618466"/>
+            <a:ext cx="10058400" cy="4023360"/>
+          </a:xfrm>
+        </p:spPr>
         <p:txBody>
           <a:bodyPr>
             <a:normAutofit/>
@@ -9012,11 +9129,54 @@
               <a:buNone/>
             </a:pPr>
             <a:r>
+              <a:rPr lang="en-US" dirty="0"/>
+              <a:t>Q</a:t>
+            </a:r>
+            <a:r>
+              <a:rPr lang="en-US" dirty="0">
+                <a:latin typeface="Times New Roman" panose="02020603050405020304" pitchFamily="18" charset="0"/>
+                <a:cs typeface="Times New Roman" panose="02020603050405020304" pitchFamily="18" charset="0"/>
+              </a:rPr>
+              <a:t> 	= {</a:t>
+            </a:r>
+            <a:r>
+              <a:rPr lang="en-US" dirty="0"/>
+              <a:t>INIT, LIGHTBARRIER_1, BETWEEN_L1_L2, LIGHTBARRIER_2, </a:t>
+            </a:r>
+            <a:r>
+              <a:rPr lang="en-US" dirty="0" smtClean="0"/>
+              <a:t>BETWEEN_L2_L3</a:t>
+            </a:r>
+            <a:r>
+              <a:rPr lang="en-US" dirty="0"/>
+              <a:t>, 	MILLING_STATION, BETWEEN_L3_L4, DRILLING_STATION, BETWEEN_L4_L5, 	LIGHTBARRIER_5, END_OF_PRODUCTION, SPECTRAL_ANALYSIS</a:t>
+            </a:r>
+            <a:r>
+              <a:rPr lang="en-US" dirty="0" smtClean="0"/>
+              <a:t>}</a:t>
+            </a:r>
+            <a:endParaRPr lang="en-US" dirty="0" smtClean="0">
+              <a:latin typeface="Times New Roman" panose="02020603050405020304" pitchFamily="18" charset="0"/>
+              <a:cs typeface="Times New Roman" panose="02020603050405020304" pitchFamily="18" charset="0"/>
+            </a:endParaRPr>
+          </a:p>
+          <a:p>
+            <a:pPr marL="0" indent="0">
+              <a:buNone/>
+            </a:pPr>
+            <a:r>
               <a:rPr lang="en-US" dirty="0" smtClean="0">
                 <a:latin typeface="Times New Roman" panose="02020603050405020304" pitchFamily="18" charset="0"/>
                 <a:cs typeface="Times New Roman" panose="02020603050405020304" pitchFamily="18" charset="0"/>
               </a:rPr>
-              <a:t>∑ 	= {</a:t>
+              <a:t>∑ </a:t>
+            </a:r>
+            <a:r>
+              <a:rPr lang="en-US" dirty="0" smtClean="0">
+                <a:latin typeface="Times New Roman" panose="02020603050405020304" pitchFamily="18" charset="0"/>
+                <a:cs typeface="Times New Roman" panose="02020603050405020304" pitchFamily="18" charset="0"/>
+              </a:rPr>
+              <a:t>	= {</a:t>
             </a:r>
             <a:r>
               <a:rPr lang="en-US" dirty="0" smtClean="0"/>
@@ -9032,31 +9192,18 @@
               <a:buNone/>
             </a:pPr>
             <a:r>
-              <a:rPr lang="en-US" dirty="0"/>
-              <a:t>Q</a:t>
-            </a:r>
-            <a:r>
-              <a:rPr lang="en-US" dirty="0" smtClean="0">
-                <a:latin typeface="Times New Roman" panose="02020603050405020304" pitchFamily="18" charset="0"/>
-                <a:cs typeface="Times New Roman" panose="02020603050405020304" pitchFamily="18" charset="0"/>
-              </a:rPr>
-              <a:t> 	= {</a:t>
-            </a:r>
-            <a:r>
-              <a:rPr lang="en-US" dirty="0" smtClean="0"/>
-              <a:t>INIT, LIGHTBARRIER_1, BETWEEN_L1_L2, LIGHTBARRIER_2, 	BETWEEN_L2_L3, 	MILLING_STATION, BETWEEN_L3_L4, DRILLING_STATION, BETWEEN_L4_L5, 	LIGHTBARRIER_5, END_OF_PRODUCTION, SPECTRAL_ANALYSIS}</a:t>
-            </a:r>
-          </a:p>
-          <a:p>
-            <a:pPr marL="0" indent="0">
-              <a:buNone/>
-            </a:pPr>
-            <a:r>
               <a:rPr lang="de-DE" dirty="0" smtClean="0">
                 <a:latin typeface="Times New Roman" panose="02020603050405020304" pitchFamily="18" charset="0"/>
                 <a:cs typeface="Times New Roman" panose="02020603050405020304" pitchFamily="18" charset="0"/>
               </a:rPr>
-              <a:t>ԛ0 	= {</a:t>
+              <a:t>ԛ0 </a:t>
+            </a:r>
+            <a:r>
+              <a:rPr lang="de-DE" dirty="0" smtClean="0">
+                <a:latin typeface="Times New Roman" panose="02020603050405020304" pitchFamily="18" charset="0"/>
+                <a:cs typeface="Times New Roman" panose="02020603050405020304" pitchFamily="18" charset="0"/>
+              </a:rPr>
+              <a:t>	= {</a:t>
             </a:r>
             <a:r>
               <a:rPr lang="en-US" dirty="0" smtClean="0"/>
@@ -9085,6 +9232,47 @@
           </a:p>
         </p:txBody>
       </p:sp>
+      <p:pic>
+        <p:nvPicPr>
+          <p:cNvPr id="1026" name="Picture 2" descr="\mathfrak{A} = \left( Q,\, \Sigma,\, \delta,\, q_0,\, F \right)"/>
+          <p:cNvPicPr>
+            <a:picLocks noChangeAspect="1" noChangeArrowheads="1"/>
+          </p:cNvPicPr>
+          <p:nvPr/>
+        </p:nvPicPr>
+        <p:blipFill>
+          <a:blip r:embed="rId2">
+            <a:extLst>
+              <a:ext uri="{28A0092B-C50C-407E-A947-70E740481C1C}">
+                <a14:useLocalDpi xmlns:a14="http://schemas.microsoft.com/office/drawing/2010/main" val="0"/>
+              </a:ext>
+            </a:extLst>
+          </a:blip>
+          <a:srcRect/>
+          <a:stretch>
+            <a:fillRect/>
+          </a:stretch>
+        </p:blipFill>
+        <p:spPr bwMode="auto">
+          <a:xfrm>
+            <a:off x="1097280" y="1934496"/>
+            <a:ext cx="4320042" cy="527447"/>
+          </a:xfrm>
+          <a:prstGeom prst="rect">
+            <a:avLst/>
+          </a:prstGeom>
+          <a:noFill/>
+          <a:extLst>
+            <a:ext uri="{909E8E84-426E-40DD-AFC4-6F175D3DCCD1}">
+              <a14:hiddenFill xmlns:a14="http://schemas.microsoft.com/office/drawing/2010/main">
+                <a:solidFill>
+                  <a:srgbClr val="FFFFFF"/>
+                </a:solidFill>
+              </a14:hiddenFill>
+            </a:ext>
+          </a:extLst>
+        </p:spPr>
+      </p:pic>
     </p:spTree>
     <p:extLst>
       <p:ext uri="{BB962C8B-B14F-4D97-AF65-F5344CB8AC3E}">
@@ -9382,7 +9570,7 @@
   <a:extraClrSchemeLst/>
   <a:extLst>
     <a:ext uri="{05A4C25C-085E-4340-85A3-A5531E510DB2}">
-      <thm15:themeFamily xmlns:thm15="http://schemas.microsoft.com/office/thememl/2012/main" xmlns="" name="Retrospect" id="{5F128B03-DCCA-4EEB-AB3B-CF2899314A46}" vid="{3F1AAB62-24C6-49D2-8E01-B56FAC9A3DCD}"/>
+      <thm15:themeFamily xmlns:thm15="http://schemas.microsoft.com/office/thememl/2012/main" name="Retrospect" id="{5F128B03-DCCA-4EEB-AB3B-CF2899314A46}" vid="{3F1AAB62-24C6-49D2-8E01-B56FAC9A3DCD}"/>
     </a:ext>
   </a:extLst>
 </a:theme>

</xml_diff>